<commit_message>
Updated manuscript, tables and new figure (forest plot of ORs)
</commit_message>
<xml_diff>
--- a/output/d_wave_study_v2.pptx
+++ b/output/d_wave_study_v2.pptx
@@ -235,7 +235,7 @@
           <a:p>
             <a:fld id="{2F3FE054-3877-4A58-917B-290F009584C0}" type="datetimeFigureOut">
               <a:rPr lang="en-US" smtClean="0"/>
-              <a:t>2/3/2024</a:t>
+              <a:t>10/26/2024</a:t>
             </a:fld>
             <a:endParaRPr lang="en-US"/>
           </a:p>
@@ -3211,7 +3211,7 @@
           <a:p>
             <a:fld id="{DB7F5A80-BC32-437B-B7DA-A5E66DDAB08D}" type="datetimeFigureOut">
               <a:rPr lang="en-US" smtClean="0"/>
-              <a:t>2/3/2024</a:t>
+              <a:t>10/26/2024</a:t>
             </a:fld>
             <a:endParaRPr lang="en-US"/>
           </a:p>
@@ -3409,7 +3409,7 @@
           <a:p>
             <a:fld id="{DB7F5A80-BC32-437B-B7DA-A5E66DDAB08D}" type="datetimeFigureOut">
               <a:rPr lang="en-US" smtClean="0"/>
-              <a:t>2/3/2024</a:t>
+              <a:t>10/26/2024</a:t>
             </a:fld>
             <a:endParaRPr lang="en-US"/>
           </a:p>
@@ -3617,7 +3617,7 @@
           <a:p>
             <a:fld id="{DB7F5A80-BC32-437B-B7DA-A5E66DDAB08D}" type="datetimeFigureOut">
               <a:rPr lang="en-US" smtClean="0"/>
-              <a:t>2/3/2024</a:t>
+              <a:t>10/26/2024</a:t>
             </a:fld>
             <a:endParaRPr lang="en-US"/>
           </a:p>
@@ -3815,7 +3815,7 @@
           <a:p>
             <a:fld id="{DB7F5A80-BC32-437B-B7DA-A5E66DDAB08D}" type="datetimeFigureOut">
               <a:rPr lang="en-US" smtClean="0"/>
-              <a:t>2/3/2024</a:t>
+              <a:t>10/26/2024</a:t>
             </a:fld>
             <a:endParaRPr lang="en-US"/>
           </a:p>
@@ -4090,7 +4090,7 @@
           <a:p>
             <a:fld id="{DB7F5A80-BC32-437B-B7DA-A5E66DDAB08D}" type="datetimeFigureOut">
               <a:rPr lang="en-US" smtClean="0"/>
-              <a:t>2/3/2024</a:t>
+              <a:t>10/26/2024</a:t>
             </a:fld>
             <a:endParaRPr lang="en-US"/>
           </a:p>
@@ -4355,7 +4355,7 @@
           <a:p>
             <a:fld id="{DB7F5A80-BC32-437B-B7DA-A5E66DDAB08D}" type="datetimeFigureOut">
               <a:rPr lang="en-US" smtClean="0"/>
-              <a:t>2/3/2024</a:t>
+              <a:t>10/26/2024</a:t>
             </a:fld>
             <a:endParaRPr lang="en-US"/>
           </a:p>
@@ -4767,7 +4767,7 @@
           <a:p>
             <a:fld id="{DB7F5A80-BC32-437B-B7DA-A5E66DDAB08D}" type="datetimeFigureOut">
               <a:rPr lang="en-US" smtClean="0"/>
-              <a:t>2/3/2024</a:t>
+              <a:t>10/26/2024</a:t>
             </a:fld>
             <a:endParaRPr lang="en-US"/>
           </a:p>
@@ -4908,7 +4908,7 @@
           <a:p>
             <a:fld id="{DB7F5A80-BC32-437B-B7DA-A5E66DDAB08D}" type="datetimeFigureOut">
               <a:rPr lang="en-US" smtClean="0"/>
-              <a:t>2/3/2024</a:t>
+              <a:t>10/26/2024</a:t>
             </a:fld>
             <a:endParaRPr lang="en-US"/>
           </a:p>
@@ -5021,7 +5021,7 @@
           <a:p>
             <a:fld id="{DB7F5A80-BC32-437B-B7DA-A5E66DDAB08D}" type="datetimeFigureOut">
               <a:rPr lang="en-US" smtClean="0"/>
-              <a:t>2/3/2024</a:t>
+              <a:t>10/26/2024</a:t>
             </a:fld>
             <a:endParaRPr lang="en-US"/>
           </a:p>
@@ -5332,7 +5332,7 @@
           <a:p>
             <a:fld id="{DB7F5A80-BC32-437B-B7DA-A5E66DDAB08D}" type="datetimeFigureOut">
               <a:rPr lang="en-US" smtClean="0"/>
-              <a:t>2/3/2024</a:t>
+              <a:t>10/26/2024</a:t>
             </a:fld>
             <a:endParaRPr lang="en-US"/>
           </a:p>
@@ -5620,7 +5620,7 @@
           <a:p>
             <a:fld id="{DB7F5A80-BC32-437B-B7DA-A5E66DDAB08D}" type="datetimeFigureOut">
               <a:rPr lang="en-US" smtClean="0"/>
-              <a:t>2/3/2024</a:t>
+              <a:t>10/26/2024</a:t>
             </a:fld>
             <a:endParaRPr lang="en-US"/>
           </a:p>
@@ -5861,7 +5861,7 @@
           <a:p>
             <a:fld id="{DB7F5A80-BC32-437B-B7DA-A5E66DDAB08D}" type="datetimeFigureOut">
               <a:rPr lang="en-US" smtClean="0"/>
-              <a:t>2/3/2024</a:t>
+              <a:t>10/26/2024</a:t>
             </a:fld>
             <a:endParaRPr lang="en-US"/>
           </a:p>
@@ -6967,7 +6967,7 @@
           <p:nvPr>
             <p:extLst>
               <p:ext uri="{D42A27DB-BD31-4B8C-83A1-F6EECF244321}">
-                <p14:modId xmlns:p14="http://schemas.microsoft.com/office/powerpoint/2010/main" val="3314037011"/>
+                <p14:modId xmlns:p14="http://schemas.microsoft.com/office/powerpoint/2010/main" val="3127673498"/>
               </p:ext>
             </p:extLst>
           </p:nvPr>
@@ -7137,6 +7137,9 @@
                     <a:p>
                       <a:r>
                         <a:rPr lang="en-US" sz="1600" dirty="0">
+                          <a:highlight>
+                            <a:srgbClr val="FFFF00"/>
+                          </a:highlight>
                           <a:latin typeface="+mn-lt"/>
                         </a:rPr>
                         <a:t>Amplitude Decrease vs. Unchanged</a:t>
@@ -7157,6 +7160,9 @@
                             <a:srgbClr val="000000"/>
                           </a:solidFill>
                           <a:effectLst/>
+                          <a:highlight>
+                            <a:srgbClr val="FFFF00"/>
+                          </a:highlight>
                           <a:latin typeface="Calibri" panose="020F0502020204030204" pitchFamily="34" charset="0"/>
                         </a:rPr>
                         <a:t>5.25</a:t>
@@ -7177,6 +7183,9 @@
                             <a:srgbClr val="000000"/>
                           </a:solidFill>
                           <a:effectLst/>
+                          <a:highlight>
+                            <a:srgbClr val="FFFF00"/>
+                          </a:highlight>
                           <a:latin typeface="Calibri" panose="020F0502020204030204" pitchFamily="34" charset="0"/>
                         </a:rPr>
                         <a:t>1.23</a:t>
@@ -7197,6 +7206,9 @@
                             <a:srgbClr val="000000"/>
                           </a:solidFill>
                           <a:effectLst/>
+                          <a:highlight>
+                            <a:srgbClr val="FFFF00"/>
+                          </a:highlight>
                           <a:latin typeface="Calibri" panose="020F0502020204030204" pitchFamily="34" charset="0"/>
                         </a:rPr>
                         <a:t>22.32</a:t>
@@ -7217,6 +7229,9 @@
                             <a:srgbClr val="000000"/>
                           </a:solidFill>
                           <a:effectLst/>
+                          <a:highlight>
+                            <a:srgbClr val="FFFF00"/>
+                          </a:highlight>
                           <a:latin typeface="Calibri" panose="020F0502020204030204" pitchFamily="34" charset="0"/>
                         </a:rPr>
                         <a:t>0.025</a:t>
@@ -7232,11 +7247,14 @@
                     <a:p>
                       <a:pPr algn="r" fontAlgn="b"/>
                       <a:r>
-                        <a:rPr lang="en-US" sz="1600" b="0" i="0" u="none" strike="noStrike">
+                        <a:rPr lang="en-US" sz="1600" b="0" i="0" u="none" strike="noStrike" dirty="0">
                           <a:solidFill>
                             <a:srgbClr val="000000"/>
                           </a:solidFill>
                           <a:effectLst/>
+                          <a:highlight>
+                            <a:srgbClr val="FFFF00"/>
+                          </a:highlight>
                           <a:latin typeface="Calibri" panose="020F0502020204030204" pitchFamily="34" charset="0"/>
                         </a:rPr>
                         <a:t>*</a:t>
@@ -7967,7 +7985,7 @@
           <p:nvPr>
             <p:extLst>
               <p:ext uri="{D42A27DB-BD31-4B8C-83A1-F6EECF244321}">
-                <p14:modId xmlns:p14="http://schemas.microsoft.com/office/powerpoint/2010/main" val="3233685116"/>
+                <p14:modId xmlns:p14="http://schemas.microsoft.com/office/powerpoint/2010/main" val="2104928054"/>
               </p:ext>
             </p:extLst>
           </p:nvPr>
@@ -8137,6 +8155,9 @@
                     <a:p>
                       <a:r>
                         <a:rPr lang="en-US" sz="1600" dirty="0">
+                          <a:highlight>
+                            <a:srgbClr val="FFFF00"/>
+                          </a:highlight>
                           <a:latin typeface="+mn-lt"/>
                         </a:rPr>
                         <a:t>Amplitude Decrease vs. Unchanged</a:t>
@@ -8157,6 +8178,9 @@
                             <a:srgbClr val="000000"/>
                           </a:solidFill>
                           <a:effectLst/>
+                          <a:highlight>
+                            <a:srgbClr val="FFFF00"/>
+                          </a:highlight>
                           <a:latin typeface="Calibri" panose="020F0502020204030204" pitchFamily="34" charset="0"/>
                         </a:rPr>
                         <a:t>5.50</a:t>
@@ -8177,6 +8201,9 @@
                             <a:srgbClr val="000000"/>
                           </a:solidFill>
                           <a:effectLst/>
+                          <a:highlight>
+                            <a:srgbClr val="FFFF00"/>
+                          </a:highlight>
                           <a:latin typeface="Calibri" panose="020F0502020204030204" pitchFamily="34" charset="0"/>
                         </a:rPr>
                         <a:t>1.48</a:t>
@@ -8197,6 +8224,9 @@
                             <a:srgbClr val="000000"/>
                           </a:solidFill>
                           <a:effectLst/>
+                          <a:highlight>
+                            <a:srgbClr val="FFFF00"/>
+                          </a:highlight>
                           <a:latin typeface="Calibri" panose="020F0502020204030204" pitchFamily="34" charset="0"/>
                         </a:rPr>
                         <a:t>20.39</a:t>
@@ -8217,6 +8247,9 @@
                             <a:srgbClr val="000000"/>
                           </a:solidFill>
                           <a:effectLst/>
+                          <a:highlight>
+                            <a:srgbClr val="FFFF00"/>
+                          </a:highlight>
                           <a:latin typeface="Calibri" panose="020F0502020204030204" pitchFamily="34" charset="0"/>
                         </a:rPr>
                         <a:t>0.011</a:t>
@@ -8237,6 +8270,9 @@
                             <a:srgbClr val="000000"/>
                           </a:solidFill>
                           <a:effectLst/>
+                          <a:highlight>
+                            <a:srgbClr val="FFFF00"/>
+                          </a:highlight>
                           <a:latin typeface="Calibri" panose="020F0502020204030204" pitchFamily="34" charset="0"/>
                         </a:rPr>
                         <a:t>*</a:t>
@@ -8259,6 +8295,9 @@
                     <a:p>
                       <a:r>
                         <a:rPr lang="en-US" sz="1600" dirty="0">
+                          <a:highlight>
+                            <a:srgbClr val="FFFF00"/>
+                          </a:highlight>
                           <a:latin typeface="+mn-lt"/>
                         </a:rPr>
                         <a:t>Loss of Response vs. Unchanged</a:t>
@@ -8279,6 +8318,9 @@
                             <a:srgbClr val="000000"/>
                           </a:solidFill>
                           <a:effectLst/>
+                          <a:highlight>
+                            <a:srgbClr val="FFFF00"/>
+                          </a:highlight>
                           <a:latin typeface="Calibri" panose="020F0502020204030204" pitchFamily="34" charset="0"/>
                         </a:rPr>
                         <a:t>4.81</a:t>
@@ -8299,6 +8341,9 @@
                             <a:srgbClr val="000000"/>
                           </a:solidFill>
                           <a:effectLst/>
+                          <a:highlight>
+                            <a:srgbClr val="FFFF00"/>
+                          </a:highlight>
                           <a:latin typeface="Calibri" panose="020F0502020204030204" pitchFamily="34" charset="0"/>
                         </a:rPr>
                         <a:t>1.26</a:t>
@@ -8319,6 +8364,9 @@
                             <a:srgbClr val="000000"/>
                           </a:solidFill>
                           <a:effectLst/>
+                          <a:highlight>
+                            <a:srgbClr val="FFFF00"/>
+                          </a:highlight>
                           <a:latin typeface="Calibri" panose="020F0502020204030204" pitchFamily="34" charset="0"/>
                         </a:rPr>
                         <a:t>18.31</a:t>
@@ -8339,6 +8387,9 @@
                             <a:srgbClr val="000000"/>
                           </a:solidFill>
                           <a:effectLst/>
+                          <a:highlight>
+                            <a:srgbClr val="FFFF00"/>
+                          </a:highlight>
                           <a:latin typeface="Calibri" panose="020F0502020204030204" pitchFamily="34" charset="0"/>
                         </a:rPr>
                         <a:t>0.021</a:t>
@@ -8359,6 +8410,9 @@
                             <a:srgbClr val="000000"/>
                           </a:solidFill>
                           <a:effectLst/>
+                          <a:highlight>
+                            <a:srgbClr val="FFFF00"/>
+                          </a:highlight>
                           <a:latin typeface="Calibri" panose="020F0502020204030204" pitchFamily="34" charset="0"/>
                         </a:rPr>
                         <a:t>*</a:t>
@@ -10491,7 +10545,7 @@
           <p:nvPr>
             <p:extLst>
               <p:ext uri="{D42A27DB-BD31-4B8C-83A1-F6EECF244321}">
-                <p14:modId xmlns:p14="http://schemas.microsoft.com/office/powerpoint/2010/main" val="2655248042"/>
+                <p14:modId xmlns:p14="http://schemas.microsoft.com/office/powerpoint/2010/main" val="2618102970"/>
               </p:ext>
             </p:extLst>
           </p:nvPr>
@@ -10661,6 +10715,9 @@
                     <a:p>
                       <a:r>
                         <a:rPr lang="en-US" sz="1600" dirty="0">
+                          <a:highlight>
+                            <a:srgbClr val="FFFF00"/>
+                          </a:highlight>
                           <a:latin typeface="+mn-lt"/>
                         </a:rPr>
                         <a:t>Amplitude Decrease vs. Unchanged</a:t>
@@ -10681,6 +10738,9 @@
                             <a:srgbClr val="000000"/>
                           </a:solidFill>
                           <a:effectLst/>
+                          <a:highlight>
+                            <a:srgbClr val="FFFF00"/>
+                          </a:highlight>
                           <a:latin typeface="Calibri" panose="020F0502020204030204" pitchFamily="34" charset="0"/>
                         </a:rPr>
                         <a:t>7.09</a:t>
@@ -10701,6 +10761,9 @@
                             <a:srgbClr val="000000"/>
                           </a:solidFill>
                           <a:effectLst/>
+                          <a:highlight>
+                            <a:srgbClr val="FFFF00"/>
+                          </a:highlight>
                           <a:latin typeface="Calibri" panose="020F0502020204030204" pitchFamily="34" charset="0"/>
                         </a:rPr>
                         <a:t>1.14</a:t>
@@ -10721,6 +10784,9 @@
                             <a:srgbClr val="000000"/>
                           </a:solidFill>
                           <a:effectLst/>
+                          <a:highlight>
+                            <a:srgbClr val="FFFF00"/>
+                          </a:highlight>
                           <a:latin typeface="Calibri" panose="020F0502020204030204" pitchFamily="34" charset="0"/>
                         </a:rPr>
                         <a:t>43.96</a:t>
@@ -10741,6 +10807,9 @@
                             <a:srgbClr val="000000"/>
                           </a:solidFill>
                           <a:effectLst/>
+                          <a:highlight>
+                            <a:srgbClr val="FFFF00"/>
+                          </a:highlight>
                           <a:latin typeface="Calibri" panose="020F0502020204030204" pitchFamily="34" charset="0"/>
                         </a:rPr>
                         <a:t>0.035</a:t>
@@ -10756,11 +10825,14 @@
                     <a:p>
                       <a:pPr algn="r" fontAlgn="b"/>
                       <a:r>
-                        <a:rPr lang="en-US" sz="1600" b="0" i="0" u="none" strike="noStrike">
+                        <a:rPr lang="en-US" sz="1600" b="0" i="0" u="none" strike="noStrike" dirty="0">
                           <a:solidFill>
                             <a:srgbClr val="000000"/>
                           </a:solidFill>
                           <a:effectLst/>
+                          <a:highlight>
+                            <a:srgbClr val="FFFF00"/>
+                          </a:highlight>
                           <a:latin typeface="Calibri" panose="020F0502020204030204" pitchFamily="34" charset="0"/>
                         </a:rPr>
                         <a:t>*</a:t>
@@ -12888,7 +12960,7 @@
           <p:nvPr>
             <p:extLst>
               <p:ext uri="{D42A27DB-BD31-4B8C-83A1-F6EECF244321}">
-                <p14:modId xmlns:p14="http://schemas.microsoft.com/office/powerpoint/2010/main" val="248348379"/>
+                <p14:modId xmlns:p14="http://schemas.microsoft.com/office/powerpoint/2010/main" val="394757696"/>
               </p:ext>
             </p:extLst>
           </p:nvPr>
@@ -13177,6 +13249,9 @@
                     <a:p>
                       <a:r>
                         <a:rPr lang="en-US" sz="1600" dirty="0">
+                          <a:highlight>
+                            <a:srgbClr val="FFFF00"/>
+                          </a:highlight>
                           <a:latin typeface="+mn-lt"/>
                         </a:rPr>
                         <a:t>Loss of Response vs. Unchanged</a:t>
@@ -13197,6 +13272,9 @@
                             <a:srgbClr val="000000"/>
                           </a:solidFill>
                           <a:effectLst/>
+                          <a:highlight>
+                            <a:srgbClr val="FFFF00"/>
+                          </a:highlight>
                           <a:latin typeface="Calibri" panose="020F0502020204030204" pitchFamily="34" charset="0"/>
                         </a:rPr>
                         <a:t>4.00</a:t>
@@ -13217,6 +13295,9 @@
                             <a:srgbClr val="000000"/>
                           </a:solidFill>
                           <a:effectLst/>
+                          <a:highlight>
+                            <a:srgbClr val="FFFF00"/>
+                          </a:highlight>
                           <a:latin typeface="Calibri" panose="020F0502020204030204" pitchFamily="34" charset="0"/>
                         </a:rPr>
                         <a:t>1.06</a:t>
@@ -13237,6 +13318,9 @@
                             <a:srgbClr val="000000"/>
                           </a:solidFill>
                           <a:effectLst/>
+                          <a:highlight>
+                            <a:srgbClr val="FFFF00"/>
+                          </a:highlight>
                           <a:latin typeface="Calibri" panose="020F0502020204030204" pitchFamily="34" charset="0"/>
                         </a:rPr>
                         <a:t>15.08</a:t>
@@ -13257,6 +13341,9 @@
                             <a:srgbClr val="000000"/>
                           </a:solidFill>
                           <a:effectLst/>
+                          <a:highlight>
+                            <a:srgbClr val="FFFF00"/>
+                          </a:highlight>
                           <a:latin typeface="Calibri" panose="020F0502020204030204" pitchFamily="34" charset="0"/>
                         </a:rPr>
                         <a:t>0.041</a:t>
@@ -13272,11 +13359,14 @@
                     <a:p>
                       <a:pPr algn="r" fontAlgn="b"/>
                       <a:r>
-                        <a:rPr lang="en-US" sz="1600" b="0" i="0" u="none" strike="noStrike">
+                        <a:rPr lang="en-US" sz="1600" b="0" i="0" u="none" strike="noStrike" dirty="0">
                           <a:solidFill>
                             <a:srgbClr val="000000"/>
                           </a:solidFill>
                           <a:effectLst/>
+                          <a:highlight>
+                            <a:srgbClr val="FFFF00"/>
+                          </a:highlight>
                           <a:latin typeface="Calibri" panose="020F0502020204030204" pitchFamily="34" charset="0"/>
                         </a:rPr>
                         <a:t>**</a:t>
@@ -17820,7 +17910,7 @@
           <p:nvPr>
             <p:extLst>
               <p:ext uri="{D42A27DB-BD31-4B8C-83A1-F6EECF244321}">
-                <p14:modId xmlns:p14="http://schemas.microsoft.com/office/powerpoint/2010/main" val="2708818282"/>
+                <p14:modId xmlns:p14="http://schemas.microsoft.com/office/powerpoint/2010/main" val="3356644096"/>
               </p:ext>
             </p:extLst>
           </p:nvPr>
@@ -18084,16 +18174,13 @@
                     <a:lstStyle/>
                     <a:p>
                       <a:pPr algn="r" fontAlgn="b"/>
-                      <a:r>
-                        <a:rPr lang="en-US" sz="1600" b="0" i="0" u="none" strike="noStrike">
-                          <a:solidFill>
-                            <a:srgbClr val="000000"/>
-                          </a:solidFill>
-                          <a:effectLst/>
-                          <a:latin typeface="Calibri" panose="020F0502020204030204" pitchFamily="34" charset="0"/>
-                        </a:rPr>
-                        <a:t>1.80</a:t>
-                      </a:r>
+                      <a:endParaRPr lang="en-US" sz="1600" b="0" i="0" u="none" strike="noStrike" dirty="0">
+                        <a:solidFill>
+                          <a:srgbClr val="000000"/>
+                        </a:solidFill>
+                        <a:effectLst/>
+                        <a:latin typeface="Calibri" panose="020F0502020204030204" pitchFamily="34" charset="0"/>
+                      </a:endParaRPr>
                     </a:p>
                   </a:txBody>
                   <a:tcPr marL="9525" marR="9525" marT="9525" marB="0" anchor="b"/>
@@ -18206,16 +18293,13 @@
                     <a:lstStyle/>
                     <a:p>
                       <a:pPr algn="r" fontAlgn="b"/>
-                      <a:r>
-                        <a:rPr lang="en-US" sz="1600" b="0" i="0" u="none" strike="noStrike">
-                          <a:solidFill>
-                            <a:srgbClr val="000000"/>
-                          </a:solidFill>
-                          <a:effectLst/>
-                          <a:latin typeface="Calibri" panose="020F0502020204030204" pitchFamily="34" charset="0"/>
-                        </a:rPr>
-                        <a:t>3.00</a:t>
-                      </a:r>
+                      <a:endParaRPr lang="en-US" sz="1600" b="0" i="0" u="none" strike="noStrike" dirty="0">
+                        <a:solidFill>
+                          <a:srgbClr val="000000"/>
+                        </a:solidFill>
+                        <a:effectLst/>
+                        <a:latin typeface="Calibri" panose="020F0502020204030204" pitchFamily="34" charset="0"/>
+                      </a:endParaRPr>
                     </a:p>
                   </a:txBody>
                   <a:tcPr marL="9525" marR="9525" marT="9525" marB="0" anchor="b"/>
@@ -18328,16 +18412,13 @@
                     <a:lstStyle/>
                     <a:p>
                       <a:pPr algn="r" fontAlgn="b"/>
-                      <a:r>
-                        <a:rPr lang="en-US" sz="1600" b="0" i="0" u="none" strike="noStrike" dirty="0">
-                          <a:solidFill>
-                            <a:srgbClr val="000000"/>
-                          </a:solidFill>
-                          <a:effectLst/>
-                          <a:latin typeface="Calibri" panose="020F0502020204030204" pitchFamily="34" charset="0"/>
-                        </a:rPr>
-                        <a:t>0.00</a:t>
-                      </a:r>
+                      <a:endParaRPr lang="en-US" sz="1600" b="0" i="0" u="none" strike="noStrike" dirty="0">
+                        <a:solidFill>
+                          <a:srgbClr val="000000"/>
+                        </a:solidFill>
+                        <a:effectLst/>
+                        <a:latin typeface="Calibri" panose="020F0502020204030204" pitchFamily="34" charset="0"/>
+                      </a:endParaRPr>
                     </a:p>
                   </a:txBody>
                   <a:tcPr marL="9525" marR="9525" marT="9525" marB="0" anchor="b"/>
@@ -19026,7 +19107,7 @@
           <p:nvPr>
             <p:extLst>
               <p:ext uri="{D42A27DB-BD31-4B8C-83A1-F6EECF244321}">
-                <p14:modId xmlns:p14="http://schemas.microsoft.com/office/powerpoint/2010/main" val="3599101372"/>
+                <p14:modId xmlns:p14="http://schemas.microsoft.com/office/powerpoint/2010/main" val="1758388375"/>
               </p:ext>
             </p:extLst>
           </p:nvPr>
@@ -19290,16 +19371,13 @@
                     <a:lstStyle/>
                     <a:p>
                       <a:pPr algn="r" fontAlgn="b"/>
-                      <a:r>
-                        <a:rPr lang="en-US" sz="1600" b="0" i="0" u="none" strike="noStrike">
-                          <a:solidFill>
-                            <a:srgbClr val="000000"/>
-                          </a:solidFill>
-                          <a:effectLst/>
-                          <a:latin typeface="Calibri" panose="020F0502020204030204" pitchFamily="34" charset="0"/>
-                        </a:rPr>
-                        <a:t>0.00</a:t>
-                      </a:r>
+                      <a:endParaRPr lang="en-US" sz="1600" b="0" i="0" u="none" strike="noStrike" dirty="0">
+                        <a:solidFill>
+                          <a:srgbClr val="000000"/>
+                        </a:solidFill>
+                        <a:effectLst/>
+                        <a:latin typeface="Calibri" panose="020F0502020204030204" pitchFamily="34" charset="0"/>
+                      </a:endParaRPr>
                     </a:p>
                   </a:txBody>
                   <a:tcPr marL="9525" marR="9525" marT="9525" marB="0" anchor="b"/>
@@ -19412,16 +19490,13 @@
                     <a:lstStyle/>
                     <a:p>
                       <a:pPr algn="r" fontAlgn="b"/>
-                      <a:r>
-                        <a:rPr lang="en-US" sz="1600" b="0" i="0" u="none" strike="noStrike">
-                          <a:solidFill>
-                            <a:srgbClr val="000000"/>
-                          </a:solidFill>
-                          <a:effectLst/>
-                          <a:latin typeface="Calibri" panose="020F0502020204030204" pitchFamily="34" charset="0"/>
-                        </a:rPr>
-                        <a:t>3.83</a:t>
-                      </a:r>
+                      <a:endParaRPr lang="en-US" sz="1600" b="0" i="0" u="none" strike="noStrike" dirty="0">
+                        <a:solidFill>
+                          <a:srgbClr val="000000"/>
+                        </a:solidFill>
+                        <a:effectLst/>
+                        <a:latin typeface="Calibri" panose="020F0502020204030204" pitchFamily="34" charset="0"/>
+                      </a:endParaRPr>
                     </a:p>
                   </a:txBody>
                   <a:tcPr marL="9525" marR="9525" marT="9525" marB="0" anchor="b"/>
@@ -19534,16 +19609,13 @@
                     <a:lstStyle/>
                     <a:p>
                       <a:pPr algn="r" fontAlgn="b"/>
-                      <a:r>
-                        <a:rPr lang="en-US" sz="1600" b="0" i="0" u="none" strike="noStrike" dirty="0">
-                          <a:solidFill>
-                            <a:srgbClr val="000000"/>
-                          </a:solidFill>
-                          <a:effectLst/>
-                          <a:latin typeface="Calibri" panose="020F0502020204030204" pitchFamily="34" charset="0"/>
-                        </a:rPr>
-                        <a:t>0.00</a:t>
-                      </a:r>
+                      <a:endParaRPr lang="en-US" sz="1600" b="0" i="0" u="none" strike="noStrike" dirty="0">
+                        <a:solidFill>
+                          <a:srgbClr val="000000"/>
+                        </a:solidFill>
+                        <a:effectLst/>
+                        <a:latin typeface="Calibri" panose="020F0502020204030204" pitchFamily="34" charset="0"/>
+                      </a:endParaRPr>
                     </a:p>
                   </a:txBody>
                   <a:tcPr marL="9525" marR="9525" marT="9525" marB="0" anchor="b"/>
@@ -34481,7 +34553,7 @@
           <p:nvPr>
             <p:extLst>
               <p:ext uri="{D42A27DB-BD31-4B8C-83A1-F6EECF244321}">
-                <p14:modId xmlns:p14="http://schemas.microsoft.com/office/powerpoint/2010/main" val="187021033"/>
+                <p14:modId xmlns:p14="http://schemas.microsoft.com/office/powerpoint/2010/main" val="2992953657"/>
               </p:ext>
             </p:extLst>
           </p:nvPr>
@@ -34770,6 +34842,9 @@
                     <a:p>
                       <a:r>
                         <a:rPr lang="en-US" sz="1600" dirty="0">
+                          <a:highlight>
+                            <a:srgbClr val="FFFF00"/>
+                          </a:highlight>
                           <a:latin typeface="+mn-lt"/>
                         </a:rPr>
                         <a:t>Loss of Response vs. Unchanged</a:t>
@@ -34790,6 +34865,9 @@
                             <a:srgbClr val="000000"/>
                           </a:solidFill>
                           <a:effectLst/>
+                          <a:highlight>
+                            <a:srgbClr val="FFFF00"/>
+                          </a:highlight>
                           <a:latin typeface="Calibri" panose="020F0502020204030204" pitchFamily="34" charset="0"/>
                         </a:rPr>
                         <a:t>25.19</a:t>
@@ -34810,6 +34888,9 @@
                             <a:srgbClr val="000000"/>
                           </a:solidFill>
                           <a:effectLst/>
+                          <a:highlight>
+                            <a:srgbClr val="FFFF00"/>
+                          </a:highlight>
                           <a:latin typeface="Calibri" panose="020F0502020204030204" pitchFamily="34" charset="0"/>
                         </a:rPr>
                         <a:t>4.70</a:t>
@@ -34830,6 +34911,9 @@
                             <a:srgbClr val="000000"/>
                           </a:solidFill>
                           <a:effectLst/>
+                          <a:highlight>
+                            <a:srgbClr val="FFFF00"/>
+                          </a:highlight>
                           <a:latin typeface="Calibri" panose="020F0502020204030204" pitchFamily="34" charset="0"/>
                         </a:rPr>
                         <a:t>135.07</a:t>
@@ -34850,6 +34934,9 @@
                             <a:srgbClr val="000000"/>
                           </a:solidFill>
                           <a:effectLst/>
+                          <a:highlight>
+                            <a:srgbClr val="FFFF00"/>
+                          </a:highlight>
                           <a:latin typeface="Calibri" panose="020F0502020204030204" pitchFamily="34" charset="0"/>
                         </a:rPr>
                         <a:t>&lt;0.001</a:t>
@@ -34870,6 +34957,9 @@
                             <a:srgbClr val="000000"/>
                           </a:solidFill>
                           <a:effectLst/>
+                          <a:highlight>
+                            <a:srgbClr val="FFFF00"/>
+                          </a:highlight>
                           <a:latin typeface="Calibri" panose="020F0502020204030204" pitchFamily="34" charset="0"/>
                         </a:rPr>
                         <a:t>**</a:t>
@@ -34985,7 +35075,7 @@
           <p:nvPr>
             <p:extLst>
               <p:ext uri="{D42A27DB-BD31-4B8C-83A1-F6EECF244321}">
-                <p14:modId xmlns:p14="http://schemas.microsoft.com/office/powerpoint/2010/main" val="4257815571"/>
+                <p14:modId xmlns:p14="http://schemas.microsoft.com/office/powerpoint/2010/main" val="2427195729"/>
               </p:ext>
             </p:extLst>
           </p:nvPr>
@@ -35170,7 +35260,7 @@
                     <a:p>
                       <a:pPr algn="r" fontAlgn="b"/>
                       <a:r>
-                        <a:rPr lang="en-US" sz="1600" b="0" i="0" u="none" strike="noStrike">
+                        <a:rPr lang="en-US" sz="1600" b="0" i="0" u="none" strike="noStrike" dirty="0">
                           <a:solidFill>
                             <a:srgbClr val="000000"/>
                           </a:solidFill>
@@ -35190,7 +35280,7 @@
                     <a:p>
                       <a:pPr algn="r" fontAlgn="b"/>
                       <a:r>
-                        <a:rPr lang="en-US" sz="1600" b="0" i="0" u="none" strike="noStrike">
+                        <a:rPr lang="en-US" sz="1600" b="0" i="0" u="none" strike="noStrike" dirty="0">
                           <a:solidFill>
                             <a:srgbClr val="000000"/>
                           </a:solidFill>
@@ -35210,7 +35300,7 @@
                     <a:p>
                       <a:pPr algn="r" fontAlgn="b"/>
                       <a:r>
-                        <a:rPr lang="en-US" sz="1600" b="0" i="0" u="none" strike="noStrike">
+                        <a:rPr lang="en-US" sz="1600" b="0" i="0" u="none" strike="noStrike" dirty="0">
                           <a:solidFill>
                             <a:srgbClr val="000000"/>
                           </a:solidFill>
@@ -35230,7 +35320,7 @@
                     <a:p>
                       <a:pPr algn="r" fontAlgn="b"/>
                       <a:r>
-                        <a:rPr lang="en-US" sz="1600" b="0" i="0" u="none" strike="noStrike">
+                        <a:rPr lang="en-US" sz="1600" b="0" i="0" u="none" strike="noStrike" dirty="0">
                           <a:solidFill>
                             <a:srgbClr val="000000"/>
                           </a:solidFill>
@@ -35274,6 +35364,9 @@
                     <a:p>
                       <a:r>
                         <a:rPr lang="en-US" sz="1600" dirty="0">
+                          <a:highlight>
+                            <a:srgbClr val="FFFF00"/>
+                          </a:highlight>
                           <a:latin typeface="+mn-lt"/>
                         </a:rPr>
                         <a:t>Loss of Response vs. Unchanged</a:t>
@@ -35294,6 +35387,9 @@
                             <a:srgbClr val="000000"/>
                           </a:solidFill>
                           <a:effectLst/>
+                          <a:highlight>
+                            <a:srgbClr val="FFFF00"/>
+                          </a:highlight>
                           <a:latin typeface="Calibri" panose="020F0502020204030204" pitchFamily="34" charset="0"/>
                         </a:rPr>
                         <a:t>11.00</a:t>
@@ -35314,6 +35410,9 @@
                             <a:srgbClr val="000000"/>
                           </a:solidFill>
                           <a:effectLst/>
+                          <a:highlight>
+                            <a:srgbClr val="FFFF00"/>
+                          </a:highlight>
                           <a:latin typeface="Calibri" panose="020F0502020204030204" pitchFamily="34" charset="0"/>
                         </a:rPr>
                         <a:t>2.76</a:t>
@@ -35334,6 +35433,9 @@
                             <a:srgbClr val="000000"/>
                           </a:solidFill>
                           <a:effectLst/>
+                          <a:highlight>
+                            <a:srgbClr val="FFFF00"/>
+                          </a:highlight>
                           <a:latin typeface="Calibri" panose="020F0502020204030204" pitchFamily="34" charset="0"/>
                         </a:rPr>
                         <a:t>43.80</a:t>
@@ -35354,6 +35456,9 @@
                             <a:srgbClr val="000000"/>
                           </a:solidFill>
                           <a:effectLst/>
+                          <a:highlight>
+                            <a:srgbClr val="FFFF00"/>
+                          </a:highlight>
                           <a:latin typeface="Calibri" panose="020F0502020204030204" pitchFamily="34" charset="0"/>
                         </a:rPr>
                         <a:t>&lt;0.001</a:t>
@@ -35374,6 +35479,9 @@
                             <a:srgbClr val="000000"/>
                           </a:solidFill>
                           <a:effectLst/>
+                          <a:highlight>
+                            <a:srgbClr val="FFFF00"/>
+                          </a:highlight>
                           <a:latin typeface="Calibri" panose="020F0502020204030204" pitchFamily="34" charset="0"/>
                         </a:rPr>
                         <a:t>**</a:t>
@@ -36564,7 +36672,7 @@
           <p:nvPr>
             <p:extLst>
               <p:ext uri="{D42A27DB-BD31-4B8C-83A1-F6EECF244321}">
-                <p14:modId xmlns:p14="http://schemas.microsoft.com/office/powerpoint/2010/main" val="1930882816"/>
+                <p14:modId xmlns:p14="http://schemas.microsoft.com/office/powerpoint/2010/main" val="3297073482"/>
               </p:ext>
             </p:extLst>
           </p:nvPr>
@@ -36853,6 +36961,9 @@
                     <a:p>
                       <a:r>
                         <a:rPr lang="en-US" sz="1600" dirty="0">
+                          <a:highlight>
+                            <a:srgbClr val="FFFF00"/>
+                          </a:highlight>
                           <a:latin typeface="+mn-lt"/>
                         </a:rPr>
                         <a:t>Loss of Response vs. Unchanged</a:t>
@@ -36873,6 +36984,9 @@
                             <a:srgbClr val="000000"/>
                           </a:solidFill>
                           <a:effectLst/>
+                          <a:highlight>
+                            <a:srgbClr val="FFFF00"/>
+                          </a:highlight>
                           <a:latin typeface="Calibri" panose="020F0502020204030204" pitchFamily="34" charset="0"/>
                         </a:rPr>
                         <a:t>7.77</a:t>
@@ -36893,6 +37007,9 @@
                             <a:srgbClr val="000000"/>
                           </a:solidFill>
                           <a:effectLst/>
+                          <a:highlight>
+                            <a:srgbClr val="FFFF00"/>
+                          </a:highlight>
                           <a:latin typeface="Calibri" panose="020F0502020204030204" pitchFamily="34" charset="0"/>
                         </a:rPr>
                         <a:t>1.95</a:t>
@@ -36913,6 +37030,9 @@
                             <a:srgbClr val="000000"/>
                           </a:solidFill>
                           <a:effectLst/>
+                          <a:highlight>
+                            <a:srgbClr val="FFFF00"/>
+                          </a:highlight>
                           <a:latin typeface="Calibri" panose="020F0502020204030204" pitchFamily="34" charset="0"/>
                         </a:rPr>
                         <a:t>30.96</a:t>
@@ -36933,6 +37053,9 @@
                             <a:srgbClr val="000000"/>
                           </a:solidFill>
                           <a:effectLst/>
+                          <a:highlight>
+                            <a:srgbClr val="FFFF00"/>
+                          </a:highlight>
                           <a:latin typeface="Calibri" panose="020F0502020204030204" pitchFamily="34" charset="0"/>
                         </a:rPr>
                         <a:t>0.004</a:t>
@@ -36953,6 +37076,9 @@
                             <a:srgbClr val="000000"/>
                           </a:solidFill>
                           <a:effectLst/>
+                          <a:highlight>
+                            <a:srgbClr val="FFFF00"/>
+                          </a:highlight>
                           <a:latin typeface="Calibri" panose="020F0502020204030204" pitchFamily="34" charset="0"/>
                         </a:rPr>
                         <a:t>**</a:t>
@@ -37564,7 +37690,7 @@
           <p:nvPr>
             <p:extLst>
               <p:ext uri="{D42A27DB-BD31-4B8C-83A1-F6EECF244321}">
-                <p14:modId xmlns:p14="http://schemas.microsoft.com/office/powerpoint/2010/main" val="2596914978"/>
+                <p14:modId xmlns:p14="http://schemas.microsoft.com/office/powerpoint/2010/main" val="1165015439"/>
               </p:ext>
             </p:extLst>
           </p:nvPr>
@@ -37853,6 +37979,9 @@
                     <a:p>
                       <a:r>
                         <a:rPr lang="en-US" sz="1600" dirty="0">
+                          <a:highlight>
+                            <a:srgbClr val="FFFF00"/>
+                          </a:highlight>
                           <a:latin typeface="+mn-lt"/>
                         </a:rPr>
                         <a:t>Loss of Response vs. Unchanged</a:t>
@@ -37873,6 +38002,9 @@
                             <a:srgbClr val="000000"/>
                           </a:solidFill>
                           <a:effectLst/>
+                          <a:highlight>
+                            <a:srgbClr val="FFFF00"/>
+                          </a:highlight>
                           <a:latin typeface="Calibri" panose="020F0502020204030204" pitchFamily="34" charset="0"/>
                         </a:rPr>
                         <a:t>11.00</a:t>
@@ -37893,6 +38025,9 @@
                             <a:srgbClr val="000000"/>
                           </a:solidFill>
                           <a:effectLst/>
+                          <a:highlight>
+                            <a:srgbClr val="FFFF00"/>
+                          </a:highlight>
                           <a:latin typeface="Calibri" panose="020F0502020204030204" pitchFamily="34" charset="0"/>
                         </a:rPr>
                         <a:t>2.76</a:t>
@@ -37913,6 +38048,9 @@
                             <a:srgbClr val="000000"/>
                           </a:solidFill>
                           <a:effectLst/>
+                          <a:highlight>
+                            <a:srgbClr val="FFFF00"/>
+                          </a:highlight>
                           <a:latin typeface="Calibri" panose="020F0502020204030204" pitchFamily="34" charset="0"/>
                         </a:rPr>
                         <a:t>43.80</a:t>
@@ -37933,6 +38071,9 @@
                             <a:srgbClr val="000000"/>
                           </a:solidFill>
                           <a:effectLst/>
+                          <a:highlight>
+                            <a:srgbClr val="FFFF00"/>
+                          </a:highlight>
                           <a:latin typeface="Calibri" panose="020F0502020204030204" pitchFamily="34" charset="0"/>
                         </a:rPr>
                         <a:t>&lt;0.001</a:t>
@@ -37953,6 +38094,9 @@
                             <a:srgbClr val="000000"/>
                           </a:solidFill>
                           <a:effectLst/>
+                          <a:highlight>
+                            <a:srgbClr val="FFFF00"/>
+                          </a:highlight>
                           <a:latin typeface="Calibri" panose="020F0502020204030204" pitchFamily="34" charset="0"/>
                         </a:rPr>
                         <a:t>**</a:t>

</xml_diff>

<commit_message>
Updated manuscript and checked output tables in PP.
</commit_message>
<xml_diff>
--- a/output/d_wave_study_v2.pptx
+++ b/output/d_wave_study_v2.pptx
@@ -235,7 +235,7 @@
           <a:p>
             <a:fld id="{2F3FE054-3877-4A58-917B-290F009584C0}" type="datetimeFigureOut">
               <a:rPr lang="en-US" smtClean="0"/>
-              <a:t>10/26/2024</a:t>
+              <a:t>11/2/2024</a:t>
             </a:fld>
             <a:endParaRPr lang="en-US"/>
           </a:p>
@@ -3211,7 +3211,7 @@
           <a:p>
             <a:fld id="{DB7F5A80-BC32-437B-B7DA-A5E66DDAB08D}" type="datetimeFigureOut">
               <a:rPr lang="en-US" smtClean="0"/>
-              <a:t>10/26/2024</a:t>
+              <a:t>11/2/2024</a:t>
             </a:fld>
             <a:endParaRPr lang="en-US"/>
           </a:p>
@@ -3409,7 +3409,7 @@
           <a:p>
             <a:fld id="{DB7F5A80-BC32-437B-B7DA-A5E66DDAB08D}" type="datetimeFigureOut">
               <a:rPr lang="en-US" smtClean="0"/>
-              <a:t>10/26/2024</a:t>
+              <a:t>11/2/2024</a:t>
             </a:fld>
             <a:endParaRPr lang="en-US"/>
           </a:p>
@@ -3617,7 +3617,7 @@
           <a:p>
             <a:fld id="{DB7F5A80-BC32-437B-B7DA-A5E66DDAB08D}" type="datetimeFigureOut">
               <a:rPr lang="en-US" smtClean="0"/>
-              <a:t>10/26/2024</a:t>
+              <a:t>11/2/2024</a:t>
             </a:fld>
             <a:endParaRPr lang="en-US"/>
           </a:p>
@@ -3815,7 +3815,7 @@
           <a:p>
             <a:fld id="{DB7F5A80-BC32-437B-B7DA-A5E66DDAB08D}" type="datetimeFigureOut">
               <a:rPr lang="en-US" smtClean="0"/>
-              <a:t>10/26/2024</a:t>
+              <a:t>11/2/2024</a:t>
             </a:fld>
             <a:endParaRPr lang="en-US"/>
           </a:p>
@@ -4090,7 +4090,7 @@
           <a:p>
             <a:fld id="{DB7F5A80-BC32-437B-B7DA-A5E66DDAB08D}" type="datetimeFigureOut">
               <a:rPr lang="en-US" smtClean="0"/>
-              <a:t>10/26/2024</a:t>
+              <a:t>11/2/2024</a:t>
             </a:fld>
             <a:endParaRPr lang="en-US"/>
           </a:p>
@@ -4355,7 +4355,7 @@
           <a:p>
             <a:fld id="{DB7F5A80-BC32-437B-B7DA-A5E66DDAB08D}" type="datetimeFigureOut">
               <a:rPr lang="en-US" smtClean="0"/>
-              <a:t>10/26/2024</a:t>
+              <a:t>11/2/2024</a:t>
             </a:fld>
             <a:endParaRPr lang="en-US"/>
           </a:p>
@@ -4767,7 +4767,7 @@
           <a:p>
             <a:fld id="{DB7F5A80-BC32-437B-B7DA-A5E66DDAB08D}" type="datetimeFigureOut">
               <a:rPr lang="en-US" smtClean="0"/>
-              <a:t>10/26/2024</a:t>
+              <a:t>11/2/2024</a:t>
             </a:fld>
             <a:endParaRPr lang="en-US"/>
           </a:p>
@@ -4908,7 +4908,7 @@
           <a:p>
             <a:fld id="{DB7F5A80-BC32-437B-B7DA-A5E66DDAB08D}" type="datetimeFigureOut">
               <a:rPr lang="en-US" smtClean="0"/>
-              <a:t>10/26/2024</a:t>
+              <a:t>11/2/2024</a:t>
             </a:fld>
             <a:endParaRPr lang="en-US"/>
           </a:p>
@@ -5021,7 +5021,7 @@
           <a:p>
             <a:fld id="{DB7F5A80-BC32-437B-B7DA-A5E66DDAB08D}" type="datetimeFigureOut">
               <a:rPr lang="en-US" smtClean="0"/>
-              <a:t>10/26/2024</a:t>
+              <a:t>11/2/2024</a:t>
             </a:fld>
             <a:endParaRPr lang="en-US"/>
           </a:p>
@@ -5332,7 +5332,7 @@
           <a:p>
             <a:fld id="{DB7F5A80-BC32-437B-B7DA-A5E66DDAB08D}" type="datetimeFigureOut">
               <a:rPr lang="en-US" smtClean="0"/>
-              <a:t>10/26/2024</a:t>
+              <a:t>11/2/2024</a:t>
             </a:fld>
             <a:endParaRPr lang="en-US"/>
           </a:p>
@@ -5620,7 +5620,7 @@
           <a:p>
             <a:fld id="{DB7F5A80-BC32-437B-B7DA-A5E66DDAB08D}" type="datetimeFigureOut">
               <a:rPr lang="en-US" smtClean="0"/>
-              <a:t>10/26/2024</a:t>
+              <a:t>11/2/2024</a:t>
             </a:fld>
             <a:endParaRPr lang="en-US"/>
           </a:p>
@@ -5861,7 +5861,7 @@
           <a:p>
             <a:fld id="{DB7F5A80-BC32-437B-B7DA-A5E66DDAB08D}" type="datetimeFigureOut">
               <a:rPr lang="en-US" smtClean="0"/>
-              <a:t>10/26/2024</a:t>
+              <a:t>11/2/2024</a:t>
             </a:fld>
             <a:endParaRPr lang="en-US"/>
           </a:p>
@@ -6369,7 +6369,7 @@
             <a:pPr algn="r"/>
             <a:r>
               <a:rPr lang="en-US" dirty="0"/>
-              <a:t>Last Update: 2/3/2024</a:t>
+              <a:t>Last Update: 11/2/2024</a:t>
             </a:r>
           </a:p>
         </p:txBody>
@@ -9836,7 +9836,7 @@
           <p:nvPr>
             <p:extLst>
               <p:ext uri="{D42A27DB-BD31-4B8C-83A1-F6EECF244321}">
-                <p14:modId xmlns:p14="http://schemas.microsoft.com/office/powerpoint/2010/main" val="3097575096"/>
+                <p14:modId xmlns:p14="http://schemas.microsoft.com/office/powerpoint/2010/main" val="2753410137"/>
               </p:ext>
             </p:extLst>
           </p:nvPr>
@@ -10475,7 +10475,7 @@
                     <a:p>
                       <a:r>
                         <a:rPr lang="en-US" sz="1600" dirty="0"/>
-                        <a:t>21</a:t>
+                        <a:t>22</a:t>
                       </a:r>
                     </a:p>
                   </a:txBody>
@@ -10501,7 +10501,7 @@
                     <a:p>
                       <a:r>
                         <a:rPr lang="en-US" sz="1600" dirty="0"/>
-                        <a:t>2</a:t>
+                        <a:t>1</a:t>
                       </a:r>
                     </a:p>
                   </a:txBody>
@@ -21055,7 +21055,7 @@
           <p:nvPr>
             <p:extLst>
               <p:ext uri="{D42A27DB-BD31-4B8C-83A1-F6EECF244321}">
-                <p14:modId xmlns:p14="http://schemas.microsoft.com/office/powerpoint/2010/main" val="3916943253"/>
+                <p14:modId xmlns:p14="http://schemas.microsoft.com/office/powerpoint/2010/main" val="4124027436"/>
               </p:ext>
             </p:extLst>
           </p:nvPr>
@@ -21115,7 +21115,7 @@
                     <a:p>
                       <a:r>
                         <a:rPr lang="en-US" sz="1600" dirty="0"/>
-                        <a:t>Intraoperative SEP in Right or Left Foot</a:t>
+                        <a:t>Distal Intraoperative D-Wave </a:t>
                       </a:r>
                     </a:p>
                   </a:txBody>
@@ -21129,7 +21129,7 @@
                       <a:pPr algn="ctr"/>
                       <a:r>
                         <a:rPr lang="en-US" sz="1600" dirty="0"/>
-                        <a:t>Sensory Function Change at 3 Months</a:t>
+                        <a:t>Motor Function Change at 3 Months</a:t>
                       </a:r>
                     </a:p>
                   </a:txBody>
@@ -21568,14 +21568,14 @@
           <p:nvPr>
             <p:extLst>
               <p:ext uri="{D42A27DB-BD31-4B8C-83A1-F6EECF244321}">
-                <p14:modId xmlns:p14="http://schemas.microsoft.com/office/powerpoint/2010/main" val="2589153543"/>
+                <p14:modId xmlns:p14="http://schemas.microsoft.com/office/powerpoint/2010/main" val="3717909038"/>
               </p:ext>
             </p:extLst>
           </p:nvPr>
         </p:nvGraphicFramePr>
         <p:xfrm>
           <a:off x="1042986" y="4975798"/>
-          <a:ext cx="9925050" cy="1516124"/>
+          <a:ext cx="9925050" cy="1737360"/>
         </p:xfrm>
         <a:graphic>
           <a:graphicData uri="http://schemas.openxmlformats.org/drawingml/2006/table">
@@ -21634,17 +21634,24 @@
                     <a:lstStyle/>
                     <a:p>
                       <a:r>
-                        <a:rPr lang="en-US" sz="1600" dirty="0" err="1">
+                        <a:rPr lang="en-US" sz="1600" b="0" dirty="0" err="1">
                           <a:latin typeface="+mn-lt"/>
                         </a:rPr>
                         <a:t>Inraoperative</a:t>
                       </a:r>
                       <a:r>
-                        <a:rPr lang="en-US" sz="1600" dirty="0">
+                        <a:rPr lang="en-US" sz="1600" b="0" dirty="0">
                           <a:latin typeface="+mn-lt"/>
                         </a:rPr>
-                        <a:t> vs. Preoperative SEP in feet</a:t>
-                      </a:r>
+                        <a:t> vs. Preoperative SEP in feet/</a:t>
+                      </a:r>
+                      <a:r>
+                        <a:rPr lang="en-US" sz="1600" b="0" dirty="0"/>
+                        <a:t>3-Month Motor Function </a:t>
+                      </a:r>
+                      <a:endParaRPr lang="en-US" sz="1600" b="0" dirty="0">
+                        <a:latin typeface="+mn-lt"/>
+                      </a:endParaRPr>
                     </a:p>
                   </a:txBody>
                   <a:tcPr/>
@@ -21755,7 +21762,7 @@
                       </a:pPr>
                       <a:r>
                         <a:rPr lang="en-US" sz="1600" dirty="0"/>
-                        <a:t>Significant Decrease/Not Detected vs. Unchanged/Non-Significant Decrease</a:t>
+                        <a:t>Significant Decrease/Not Detected vs. Unchanged/Worse</a:t>
                       </a:r>
                     </a:p>
                   </a:txBody>
@@ -21847,7 +21854,7 @@
                     <a:lstStyle/>
                     <a:p>
                       <a:pPr algn="r" fontAlgn="b"/>
-                      <a:endParaRPr lang="en-US" sz="1600" b="0" i="0" u="none" strike="noStrike">
+                      <a:endParaRPr lang="en-US" sz="1600" b="0" i="0" u="none" strike="noStrike" dirty="0">
                         <a:solidFill>
                           <a:srgbClr val="000000"/>
                         </a:solidFill>
@@ -27066,7 +27073,7 @@
                     <a:p>
                       <a:pPr algn="r" fontAlgn="b"/>
                       <a:r>
-                        <a:rPr lang="en-US" sz="1600" b="0" i="0" u="none" strike="noStrike">
+                        <a:rPr lang="en-US" sz="1600" b="0" i="0" u="none" strike="noStrike" dirty="0">
                           <a:solidFill>
                             <a:srgbClr val="000000"/>
                           </a:solidFill>
@@ -34553,14 +34560,14 @@
           <p:nvPr>
             <p:extLst>
               <p:ext uri="{D42A27DB-BD31-4B8C-83A1-F6EECF244321}">
-                <p14:modId xmlns:p14="http://schemas.microsoft.com/office/powerpoint/2010/main" val="2992953657"/>
+                <p14:modId xmlns:p14="http://schemas.microsoft.com/office/powerpoint/2010/main" val="2790193262"/>
               </p:ext>
             </p:extLst>
           </p:nvPr>
         </p:nvGraphicFramePr>
         <p:xfrm>
           <a:off x="1133474" y="4812148"/>
-          <a:ext cx="9925050" cy="1073652"/>
+          <a:ext cx="9925050" cy="1294888"/>
         </p:xfrm>
         <a:graphic>
           <a:graphicData uri="http://schemas.openxmlformats.org/drawingml/2006/table">
@@ -34619,17 +34626,24 @@
                     <a:lstStyle/>
                     <a:p>
                       <a:r>
-                        <a:rPr lang="en-US" sz="1600" dirty="0" err="1">
+                        <a:rPr lang="en-US" sz="1600" b="0" i="0" dirty="0" err="1">
                           <a:latin typeface="+mn-lt"/>
                         </a:rPr>
                         <a:t>Inraoperative</a:t>
                       </a:r>
                       <a:r>
-                        <a:rPr lang="en-US" sz="1600" dirty="0">
+                        <a:rPr lang="en-US" sz="1600" b="0" i="0" dirty="0">
                           <a:latin typeface="+mn-lt"/>
                         </a:rPr>
-                        <a:t> vs. Preoperative SEP in feet</a:t>
-                      </a:r>
+                        <a:t> vs. Preoperative SEP in feet/</a:t>
+                      </a:r>
+                      <a:r>
+                        <a:rPr lang="en-US" sz="1600" b="0" i="0" dirty="0"/>
+                        <a:t>3-Month Sensory Function Change</a:t>
+                      </a:r>
+                      <a:endParaRPr lang="en-US" sz="1600" b="0" i="0" dirty="0">
+                        <a:latin typeface="+mn-lt"/>
+                      </a:endParaRPr>
                     </a:p>
                   </a:txBody>
                   <a:tcPr/>
@@ -34725,7 +34739,7 @@
                         <a:rPr lang="en-US" sz="1600" dirty="0">
                           <a:latin typeface="+mn-lt"/>
                         </a:rPr>
-                        <a:t>Amplitude Decrease vs. Unchanged</a:t>
+                        <a:t>Amplitude Decrease vs. Unchanged/Worse</a:t>
                       </a:r>
                     </a:p>
                   </a:txBody>
@@ -35515,7 +35529,7 @@
           <p:nvPr>
             <p:extLst>
               <p:ext uri="{D42A27DB-BD31-4B8C-83A1-F6EECF244321}">
-                <p14:modId xmlns:p14="http://schemas.microsoft.com/office/powerpoint/2010/main" val="3671406880"/>
+                <p14:modId xmlns:p14="http://schemas.microsoft.com/office/powerpoint/2010/main" val="1878203566"/>
               </p:ext>
             </p:extLst>
           </p:nvPr>
@@ -36024,7 +36038,7 @@
                     <a:p>
                       <a:r>
                         <a:rPr lang="en-US" sz="1600" dirty="0"/>
-                        <a:t>21</a:t>
+                        <a:t>22</a:t>
                       </a:r>
                     </a:p>
                   </a:txBody>
@@ -36050,7 +36064,7 @@
                     <a:p>
                       <a:r>
                         <a:rPr lang="en-US" sz="1600" dirty="0"/>
-                        <a:t>3</a:t>
+                        <a:t>2</a:t>
                       </a:r>
                     </a:p>
                   </a:txBody>

</xml_diff>